<commit_message>
Removed guidlines from plots
</commit_message>
<xml_diff>
--- a/presentation/WileyWinters_Assignment6.pptx
+++ b/presentation/WileyWinters_Assignment6.pptx
@@ -124,6 +124,7 @@
 <p1510:revInfo xmlns:a="http://schemas.openxmlformats.org/drawingml/2006/main" xmlns:r="http://schemas.openxmlformats.org/officeDocument/2006/relationships" xmlns:p1510="http://schemas.microsoft.com/office/powerpoint/2015/10/main">
   <p1510:revLst>
     <p1510:client id="{149706DA-3234-67FD-5957-179FAA90497C}" v="1949" dt="2024-02-23T17:37:25.835"/>
+    <p1510:client id="{87B5131C-8F8B-A34F-A83C-DCD861F894A8}" v="26" dt="2024-02-24T19:24:56.194"/>
   </p1510:revLst>
 </p1510:revInfo>
 </file>
@@ -275,7 +276,7 @@
           <a:p>
             <a:fld id="{DEB3416E-4F82-4F10-9177-896BFD4BC421}" type="datetimeFigureOut">
               <a:rPr lang="en-US" smtClean="0"/>
-              <a:t>2/23/2024</a:t>
+              <a:t>2/24/2024</a:t>
             </a:fld>
             <a:endParaRPr lang="en-US"/>
           </a:p>
@@ -473,7 +474,7 @@
           <a:p>
             <a:fld id="{DEB3416E-4F82-4F10-9177-896BFD4BC421}" type="datetimeFigureOut">
               <a:rPr lang="en-US" smtClean="0"/>
-              <a:t>2/23/2024</a:t>
+              <a:t>2/24/2024</a:t>
             </a:fld>
             <a:endParaRPr lang="en-US"/>
           </a:p>
@@ -681,7 +682,7 @@
           <a:p>
             <a:fld id="{DEB3416E-4F82-4F10-9177-896BFD4BC421}" type="datetimeFigureOut">
               <a:rPr lang="en-US" smtClean="0"/>
-              <a:t>2/23/2024</a:t>
+              <a:t>2/24/2024</a:t>
             </a:fld>
             <a:endParaRPr lang="en-US"/>
           </a:p>
@@ -879,7 +880,7 @@
           <a:p>
             <a:fld id="{DEB3416E-4F82-4F10-9177-896BFD4BC421}" type="datetimeFigureOut">
               <a:rPr lang="en-US" smtClean="0"/>
-              <a:t>2/23/2024</a:t>
+              <a:t>2/24/2024</a:t>
             </a:fld>
             <a:endParaRPr lang="en-US"/>
           </a:p>
@@ -1154,7 +1155,7 @@
           <a:p>
             <a:fld id="{DEB3416E-4F82-4F10-9177-896BFD4BC421}" type="datetimeFigureOut">
               <a:rPr lang="en-US" smtClean="0"/>
-              <a:t>2/23/2024</a:t>
+              <a:t>2/24/2024</a:t>
             </a:fld>
             <a:endParaRPr lang="en-US"/>
           </a:p>
@@ -1419,7 +1420,7 @@
           <a:p>
             <a:fld id="{DEB3416E-4F82-4F10-9177-896BFD4BC421}" type="datetimeFigureOut">
               <a:rPr lang="en-US" smtClean="0"/>
-              <a:t>2/23/2024</a:t>
+              <a:t>2/24/2024</a:t>
             </a:fld>
             <a:endParaRPr lang="en-US"/>
           </a:p>
@@ -1831,7 +1832,7 @@
           <a:p>
             <a:fld id="{DEB3416E-4F82-4F10-9177-896BFD4BC421}" type="datetimeFigureOut">
               <a:rPr lang="en-US" smtClean="0"/>
-              <a:t>2/23/2024</a:t>
+              <a:t>2/24/2024</a:t>
             </a:fld>
             <a:endParaRPr lang="en-US"/>
           </a:p>
@@ -1972,7 +1973,7 @@
           <a:p>
             <a:fld id="{DEB3416E-4F82-4F10-9177-896BFD4BC421}" type="datetimeFigureOut">
               <a:rPr lang="en-US" smtClean="0"/>
-              <a:t>2/23/2024</a:t>
+              <a:t>2/24/2024</a:t>
             </a:fld>
             <a:endParaRPr lang="en-US"/>
           </a:p>
@@ -2085,7 +2086,7 @@
           <a:p>
             <a:fld id="{DEB3416E-4F82-4F10-9177-896BFD4BC421}" type="datetimeFigureOut">
               <a:rPr lang="en-US" smtClean="0"/>
-              <a:t>2/23/2024</a:t>
+              <a:t>2/24/2024</a:t>
             </a:fld>
             <a:endParaRPr lang="en-US"/>
           </a:p>
@@ -2396,7 +2397,7 @@
           <a:p>
             <a:fld id="{DEB3416E-4F82-4F10-9177-896BFD4BC421}" type="datetimeFigureOut">
               <a:rPr lang="en-US" smtClean="0"/>
-              <a:t>2/23/2024</a:t>
+              <a:t>2/24/2024</a:t>
             </a:fld>
             <a:endParaRPr lang="en-US"/>
           </a:p>
@@ -2684,7 +2685,7 @@
           <a:p>
             <a:fld id="{DEB3416E-4F82-4F10-9177-896BFD4BC421}" type="datetimeFigureOut">
               <a:rPr lang="en-US" smtClean="0"/>
-              <a:t>2/23/2024</a:t>
+              <a:t>2/24/2024</a:t>
             </a:fld>
             <a:endParaRPr lang="en-US"/>
           </a:p>
@@ -2925,7 +2926,7 @@
           <a:p>
             <a:fld id="{DEB3416E-4F82-4F10-9177-896BFD4BC421}" type="datetimeFigureOut">
               <a:rPr lang="en-US" smtClean="0"/>
-              <a:t>2/23/2024</a:t>
+              <a:t>2/24/2024</a:t>
             </a:fld>
             <a:endParaRPr lang="en-US"/>
           </a:p>
@@ -3835,35 +3836,6 @@
       </p:sp>
       <p:pic>
         <p:nvPicPr>
-          <p:cNvPr id="6" name="Content Placeholder 5" descr="A graph of blue bars with black text&#10;&#10;Description automatically generated">
-            <a:extLst>
-              <a:ext uri="{FF2B5EF4-FFF2-40B4-BE49-F238E27FC236}">
-                <a16:creationId xmlns:a16="http://schemas.microsoft.com/office/drawing/2014/main" id="{845EB5BF-6A7A-61B1-E6E4-1E498611F03D}"/>
-              </a:ext>
-            </a:extLst>
-          </p:cNvPr>
-          <p:cNvPicPr>
-            <a:picLocks noGrp="1" noChangeAspect="1"/>
-          </p:cNvPicPr>
-          <p:nvPr>
-            <p:ph idx="1"/>
-          </p:nvPr>
-        </p:nvPicPr>
-        <p:blipFill>
-          <a:blip r:embed="rId2"/>
-          <a:stretch>
-            <a:fillRect/>
-          </a:stretch>
-        </p:blipFill>
-        <p:spPr>
-          <a:xfrm>
-            <a:off x="5103961" y="2127298"/>
-            <a:ext cx="6540548" cy="3896134"/>
-          </a:xfrm>
-        </p:spPr>
-      </p:pic>
-      <p:pic>
-        <p:nvPicPr>
           <p:cNvPr id="5" name="Picture 4" descr="A blue and white logo&#10;&#10;Description automatically generated">
             <a:extLst>
               <a:ext uri="{FF2B5EF4-FFF2-40B4-BE49-F238E27FC236}">
@@ -3877,7 +3849,7 @@
           <p:nvPr/>
         </p:nvPicPr>
         <p:blipFill>
-          <a:blip r:embed="rId3"/>
+          <a:blip r:embed="rId2"/>
           <a:stretch>
             <a:fillRect/>
           </a:stretch>
@@ -3906,8 +3878,8 @@
         </p:nvSpPr>
         <p:spPr>
           <a:xfrm>
-            <a:off x="835612" y="1836564"/>
-            <a:ext cx="4273239" cy="4708981"/>
+            <a:off x="433046" y="1836564"/>
+            <a:ext cx="4690183" cy="4401205"/>
           </a:xfrm>
           <a:prstGeom prst="rect">
             <a:avLst/>
@@ -3976,6 +3948,35 @@
           </a:p>
         </p:txBody>
       </p:sp>
+      <p:pic>
+        <p:nvPicPr>
+          <p:cNvPr id="8" name="Content Placeholder 7" descr="A graph of the united states&#10;&#10;Description automatically generated">
+            <a:extLst>
+              <a:ext uri="{FF2B5EF4-FFF2-40B4-BE49-F238E27FC236}">
+                <a16:creationId xmlns:a16="http://schemas.microsoft.com/office/drawing/2014/main" id="{BDDD8AB5-AECF-C942-AE96-A1D4C263CDC7}"/>
+              </a:ext>
+            </a:extLst>
+          </p:cNvPr>
+          <p:cNvPicPr>
+            <a:picLocks noGrp="1" noChangeAspect="1"/>
+          </p:cNvPicPr>
+          <p:nvPr>
+            <p:ph idx="1"/>
+          </p:nvPr>
+        </p:nvPicPr>
+        <p:blipFill>
+          <a:blip r:embed="rId3"/>
+          <a:stretch>
+            <a:fillRect/>
+          </a:stretch>
+        </p:blipFill>
+        <p:spPr>
+          <a:xfrm>
+            <a:off x="5118340" y="1839752"/>
+            <a:ext cx="6642339" cy="3963649"/>
+          </a:xfrm>
+        </p:spPr>
+      </p:pic>
     </p:spTree>
     <p:extLst>
       <p:ext uri="{BB962C8B-B14F-4D97-AF65-F5344CB8AC3E}">
@@ -4040,35 +4041,6 @@
       </p:sp>
       <p:pic>
         <p:nvPicPr>
-          <p:cNvPr id="6" name="Content Placeholder 5">
-            <a:extLst>
-              <a:ext uri="{FF2B5EF4-FFF2-40B4-BE49-F238E27FC236}">
-                <a16:creationId xmlns:a16="http://schemas.microsoft.com/office/drawing/2014/main" id="{73BCD143-CE50-E069-D0C1-C55BF666B04A}"/>
-              </a:ext>
-            </a:extLst>
-          </p:cNvPr>
-          <p:cNvPicPr>
-            <a:picLocks noGrp="1" noChangeAspect="1"/>
-          </p:cNvPicPr>
-          <p:nvPr>
-            <p:ph idx="1"/>
-          </p:nvPr>
-        </p:nvPicPr>
-        <p:blipFill>
-          <a:blip r:embed="rId2"/>
-          <a:stretch>
-            <a:fillRect/>
-          </a:stretch>
-        </p:blipFill>
-        <p:spPr>
-          <a:xfrm>
-            <a:off x="5233359" y="1608906"/>
-            <a:ext cx="6124754" cy="3648965"/>
-          </a:xfrm>
-        </p:spPr>
-      </p:pic>
-      <p:pic>
-        <p:nvPicPr>
           <p:cNvPr id="5" name="Picture 4" descr="A blue and white logo&#10;&#10;Description automatically generated">
             <a:extLst>
               <a:ext uri="{FF2B5EF4-FFF2-40B4-BE49-F238E27FC236}">
@@ -4082,7 +4054,7 @@
           <p:nvPr/>
         </p:nvPicPr>
         <p:blipFill>
-          <a:blip r:embed="rId3"/>
+          <a:blip r:embed="rId2"/>
           <a:stretch>
             <a:fillRect/>
           </a:stretch>
@@ -4181,6 +4153,35 @@
           </a:p>
         </p:txBody>
       </p:sp>
+      <p:pic>
+        <p:nvPicPr>
+          <p:cNvPr id="8" name="Content Placeholder 7" descr="A graph of a company size&#10;&#10;Description automatically generated">
+            <a:extLst>
+              <a:ext uri="{FF2B5EF4-FFF2-40B4-BE49-F238E27FC236}">
+                <a16:creationId xmlns:a16="http://schemas.microsoft.com/office/drawing/2014/main" id="{DD3AB24C-1027-0ADC-EBB6-C96FF8D9AB21}"/>
+              </a:ext>
+            </a:extLst>
+          </p:cNvPr>
+          <p:cNvPicPr>
+            <a:picLocks noGrp="1" noChangeAspect="1"/>
+          </p:cNvPicPr>
+          <p:nvPr>
+            <p:ph idx="1"/>
+          </p:nvPr>
+        </p:nvPicPr>
+        <p:blipFill>
+          <a:blip r:embed="rId3"/>
+          <a:stretch>
+            <a:fillRect/>
+          </a:stretch>
+        </p:blipFill>
+        <p:spPr>
+          <a:xfrm>
+            <a:off x="5190227" y="1709547"/>
+            <a:ext cx="6441056" cy="3850248"/>
+          </a:xfrm>
+        </p:spPr>
+      </p:pic>
     </p:spTree>
     <p:extLst>
       <p:ext uri="{BB962C8B-B14F-4D97-AF65-F5344CB8AC3E}">
@@ -4258,35 +4259,6 @@
       </p:sp>
       <p:pic>
         <p:nvPicPr>
-          <p:cNvPr id="6" name="Content Placeholder 5">
-            <a:extLst>
-              <a:ext uri="{FF2B5EF4-FFF2-40B4-BE49-F238E27FC236}">
-                <a16:creationId xmlns:a16="http://schemas.microsoft.com/office/drawing/2014/main" id="{753B2400-A1E3-076B-FEB0-346CDF1FE4FD}"/>
-              </a:ext>
-            </a:extLst>
-          </p:cNvPr>
-          <p:cNvPicPr>
-            <a:picLocks noGrp="1" noChangeAspect="1"/>
-          </p:cNvPicPr>
-          <p:nvPr>
-            <p:ph idx="1"/>
-          </p:nvPr>
-        </p:nvPicPr>
-        <p:blipFill>
-          <a:blip r:embed="rId2"/>
-          <a:stretch>
-            <a:fillRect/>
-          </a:stretch>
-        </p:blipFill>
-        <p:spPr>
-          <a:xfrm>
-            <a:off x="4600755" y="1705516"/>
-            <a:ext cx="6757358" cy="4490915"/>
-          </a:xfrm>
-        </p:spPr>
-      </p:pic>
-      <p:pic>
-        <p:nvPicPr>
           <p:cNvPr id="5" name="Picture 4" descr="A blue and white logo&#10;&#10;Description automatically generated">
             <a:extLst>
               <a:ext uri="{FF2B5EF4-FFF2-40B4-BE49-F238E27FC236}">
@@ -4300,7 +4272,7 @@
           <p:nvPr/>
         </p:nvPicPr>
         <p:blipFill>
-          <a:blip r:embed="rId3"/>
+          <a:blip r:embed="rId2"/>
           <a:stretch>
             <a:fillRect/>
           </a:stretch>
@@ -4396,6 +4368,35 @@
           </a:p>
         </p:txBody>
       </p:sp>
+      <p:pic>
+        <p:nvPicPr>
+          <p:cNvPr id="8" name="Content Placeholder 7">
+            <a:extLst>
+              <a:ext uri="{FF2B5EF4-FFF2-40B4-BE49-F238E27FC236}">
+                <a16:creationId xmlns:a16="http://schemas.microsoft.com/office/drawing/2014/main" id="{6F7C7029-D909-0097-D471-85157241919C}"/>
+              </a:ext>
+            </a:extLst>
+          </p:cNvPr>
+          <p:cNvPicPr>
+            <a:picLocks noGrp="1" noChangeAspect="1"/>
+          </p:cNvPicPr>
+          <p:nvPr>
+            <p:ph idx="1"/>
+          </p:nvPr>
+        </p:nvPicPr>
+        <p:blipFill>
+          <a:blip r:embed="rId3"/>
+          <a:stretch>
+            <a:fillRect/>
+          </a:stretch>
+        </p:blipFill>
+        <p:spPr>
+          <a:xfrm>
+            <a:off x="4586379" y="1705516"/>
+            <a:ext cx="6771734" cy="4490914"/>
+          </a:xfrm>
+        </p:spPr>
+      </p:pic>
     </p:spTree>
     <p:extLst>
       <p:ext uri="{BB962C8B-B14F-4D97-AF65-F5344CB8AC3E}">
@@ -4473,35 +4474,6 @@
       </p:sp>
       <p:pic>
         <p:nvPicPr>
-          <p:cNvPr id="6" name="Content Placeholder 5" descr="A graph of a bar chart&#10;&#10;Description automatically generated">
-            <a:extLst>
-              <a:ext uri="{FF2B5EF4-FFF2-40B4-BE49-F238E27FC236}">
-                <a16:creationId xmlns:a16="http://schemas.microsoft.com/office/drawing/2014/main" id="{A8F1B51E-0A3A-FB4F-B109-AFCC9E746DA5}"/>
-              </a:ext>
-            </a:extLst>
-          </p:cNvPr>
-          <p:cNvPicPr>
-            <a:picLocks noGrp="1" noChangeAspect="1"/>
-          </p:cNvPicPr>
-          <p:nvPr>
-            <p:ph idx="1"/>
-          </p:nvPr>
-        </p:nvPicPr>
-        <p:blipFill>
-          <a:blip r:embed="rId2"/>
-          <a:stretch>
-            <a:fillRect/>
-          </a:stretch>
-        </p:blipFill>
-        <p:spPr>
-          <a:xfrm>
-            <a:off x="4687019" y="1705516"/>
-            <a:ext cx="6671094" cy="4419028"/>
-          </a:xfrm>
-        </p:spPr>
-      </p:pic>
-      <p:pic>
-        <p:nvPicPr>
           <p:cNvPr id="5" name="Picture 4" descr="A blue and white logo&#10;&#10;Description automatically generated">
             <a:extLst>
               <a:ext uri="{FF2B5EF4-FFF2-40B4-BE49-F238E27FC236}">
@@ -4515,7 +4487,7 @@
           <p:nvPr/>
         </p:nvPicPr>
         <p:blipFill>
-          <a:blip r:embed="rId3"/>
+          <a:blip r:embed="rId2"/>
           <a:stretch>
             <a:fillRect/>
           </a:stretch>
@@ -4601,6 +4573,35 @@
           </a:p>
         </p:txBody>
       </p:sp>
+      <p:pic>
+        <p:nvPicPr>
+          <p:cNvPr id="8" name="Content Placeholder 7" descr="A graph of a bar chart&#10;&#10;Description automatically generated">
+            <a:extLst>
+              <a:ext uri="{FF2B5EF4-FFF2-40B4-BE49-F238E27FC236}">
+                <a16:creationId xmlns:a16="http://schemas.microsoft.com/office/drawing/2014/main" id="{85347B8D-97C7-C007-477A-70A36BC7CE0C}"/>
+              </a:ext>
+            </a:extLst>
+          </p:cNvPr>
+          <p:cNvPicPr>
+            <a:picLocks noGrp="1" noChangeAspect="1"/>
+          </p:cNvPicPr>
+          <p:nvPr>
+            <p:ph idx="1"/>
+          </p:nvPr>
+        </p:nvPicPr>
+        <p:blipFill>
+          <a:blip r:embed="rId3"/>
+          <a:stretch>
+            <a:fillRect/>
+          </a:stretch>
+        </p:blipFill>
+        <p:spPr>
+          <a:xfrm>
+            <a:off x="4600755" y="1705516"/>
+            <a:ext cx="6757358" cy="4490915"/>
+          </a:xfrm>
+        </p:spPr>
+      </p:pic>
     </p:spTree>
     <p:extLst>
       <p:ext uri="{BB962C8B-B14F-4D97-AF65-F5344CB8AC3E}">

</xml_diff>

<commit_message>
Made adjustments to annotations
</commit_message>
<xml_diff>
--- a/presentation/WileyWinters_Assignment6.pptx
+++ b/presentation/WileyWinters_Assignment6.pptx
@@ -124,6 +124,7 @@
 <p1510:revInfo xmlns:a="http://schemas.openxmlformats.org/drawingml/2006/main" xmlns:r="http://schemas.openxmlformats.org/officeDocument/2006/relationships" xmlns:p1510="http://schemas.microsoft.com/office/powerpoint/2015/10/main">
   <p1510:revLst>
     <p1510:client id="{149706DA-3234-67FD-5957-179FAA90497C}" v="1949" dt="2024-02-23T17:37:25.835"/>
+    <p1510:client id="{7E3D2D17-5F41-E9C5-AAE1-87383A0DEF2C}" v="5" dt="2024-02-24T19:42:29.848"/>
     <p1510:client id="{87B5131C-8F8B-A34F-A83C-DCD861F894A8}" v="26" dt="2024-02-24T19:24:56.194"/>
   </p1510:revLst>
 </p1510:revInfo>
@@ -4370,10 +4371,10 @@
       </p:sp>
       <p:pic>
         <p:nvPicPr>
-          <p:cNvPr id="8" name="Content Placeholder 7">
-            <a:extLst>
-              <a:ext uri="{FF2B5EF4-FFF2-40B4-BE49-F238E27FC236}">
-                <a16:creationId xmlns:a16="http://schemas.microsoft.com/office/drawing/2014/main" id="{6F7C7029-D909-0097-D471-85157241919C}"/>
+          <p:cNvPr id="6" name="Content Placeholder 5">
+            <a:extLst>
+              <a:ext uri="{FF2B5EF4-FFF2-40B4-BE49-F238E27FC236}">
+                <a16:creationId xmlns:a16="http://schemas.microsoft.com/office/drawing/2014/main" id="{59540079-C174-4E4E-6D04-20D2292D9BDF}"/>
               </a:ext>
             </a:extLst>
           </p:cNvPr>
@@ -4392,8 +4393,8 @@
         </p:blipFill>
         <p:spPr>
           <a:xfrm>
-            <a:off x="4586379" y="1705516"/>
-            <a:ext cx="6771734" cy="4490914"/>
+            <a:off x="4830793" y="1532988"/>
+            <a:ext cx="6886754" cy="4548424"/>
           </a:xfrm>
         </p:spPr>
       </p:pic>

</xml_diff>

<commit_message>
Changed text boxes to annotations
</commit_message>
<xml_diff>
--- a/presentation/WileyWinters_Assignment6.pptx
+++ b/presentation/WileyWinters_Assignment6.pptx
@@ -124,6 +124,7 @@
 <p1510:revInfo xmlns:a="http://schemas.openxmlformats.org/drawingml/2006/main" xmlns:r="http://schemas.openxmlformats.org/officeDocument/2006/relationships" xmlns:p1510="http://schemas.microsoft.com/office/powerpoint/2015/10/main">
   <p1510:revLst>
     <p1510:client id="{149706DA-3234-67FD-5957-179FAA90497C}" v="1949" dt="2024-02-23T17:37:25.835"/>
+    <p1510:client id="{5A24CF2F-1165-F158-59A4-9DBD432E1566}" v="13" dt="2024-02-25T11:27:48.878"/>
     <p1510:client id="{7E3D2D17-5F41-E9C5-AAE1-87383A0DEF2C}" v="5" dt="2024-02-24T19:42:29.848"/>
     <p1510:client id="{87B5131C-8F8B-A34F-A83C-DCD861F894A8}" v="26" dt="2024-02-24T19:24:56.194"/>
   </p1510:revLst>
@@ -277,7 +278,7 @@
           <a:p>
             <a:fld id="{DEB3416E-4F82-4F10-9177-896BFD4BC421}" type="datetimeFigureOut">
               <a:rPr lang="en-US" smtClean="0"/>
-              <a:t>2/24/2024</a:t>
+              <a:t>2/25/2024</a:t>
             </a:fld>
             <a:endParaRPr lang="en-US"/>
           </a:p>
@@ -475,7 +476,7 @@
           <a:p>
             <a:fld id="{DEB3416E-4F82-4F10-9177-896BFD4BC421}" type="datetimeFigureOut">
               <a:rPr lang="en-US" smtClean="0"/>
-              <a:t>2/24/2024</a:t>
+              <a:t>2/25/2024</a:t>
             </a:fld>
             <a:endParaRPr lang="en-US"/>
           </a:p>
@@ -683,7 +684,7 @@
           <a:p>
             <a:fld id="{DEB3416E-4F82-4F10-9177-896BFD4BC421}" type="datetimeFigureOut">
               <a:rPr lang="en-US" smtClean="0"/>
-              <a:t>2/24/2024</a:t>
+              <a:t>2/25/2024</a:t>
             </a:fld>
             <a:endParaRPr lang="en-US"/>
           </a:p>
@@ -881,7 +882,7 @@
           <a:p>
             <a:fld id="{DEB3416E-4F82-4F10-9177-896BFD4BC421}" type="datetimeFigureOut">
               <a:rPr lang="en-US" smtClean="0"/>
-              <a:t>2/24/2024</a:t>
+              <a:t>2/25/2024</a:t>
             </a:fld>
             <a:endParaRPr lang="en-US"/>
           </a:p>
@@ -1156,7 +1157,7 @@
           <a:p>
             <a:fld id="{DEB3416E-4F82-4F10-9177-896BFD4BC421}" type="datetimeFigureOut">
               <a:rPr lang="en-US" smtClean="0"/>
-              <a:t>2/24/2024</a:t>
+              <a:t>2/25/2024</a:t>
             </a:fld>
             <a:endParaRPr lang="en-US"/>
           </a:p>
@@ -1421,7 +1422,7 @@
           <a:p>
             <a:fld id="{DEB3416E-4F82-4F10-9177-896BFD4BC421}" type="datetimeFigureOut">
               <a:rPr lang="en-US" smtClean="0"/>
-              <a:t>2/24/2024</a:t>
+              <a:t>2/25/2024</a:t>
             </a:fld>
             <a:endParaRPr lang="en-US"/>
           </a:p>
@@ -1833,7 +1834,7 @@
           <a:p>
             <a:fld id="{DEB3416E-4F82-4F10-9177-896BFD4BC421}" type="datetimeFigureOut">
               <a:rPr lang="en-US" smtClean="0"/>
-              <a:t>2/24/2024</a:t>
+              <a:t>2/25/2024</a:t>
             </a:fld>
             <a:endParaRPr lang="en-US"/>
           </a:p>
@@ -1974,7 +1975,7 @@
           <a:p>
             <a:fld id="{DEB3416E-4F82-4F10-9177-896BFD4BC421}" type="datetimeFigureOut">
               <a:rPr lang="en-US" smtClean="0"/>
-              <a:t>2/24/2024</a:t>
+              <a:t>2/25/2024</a:t>
             </a:fld>
             <a:endParaRPr lang="en-US"/>
           </a:p>
@@ -2087,7 +2088,7 @@
           <a:p>
             <a:fld id="{DEB3416E-4F82-4F10-9177-896BFD4BC421}" type="datetimeFigureOut">
               <a:rPr lang="en-US" smtClean="0"/>
-              <a:t>2/24/2024</a:t>
+              <a:t>2/25/2024</a:t>
             </a:fld>
             <a:endParaRPr lang="en-US"/>
           </a:p>
@@ -2398,7 +2399,7 @@
           <a:p>
             <a:fld id="{DEB3416E-4F82-4F10-9177-896BFD4BC421}" type="datetimeFigureOut">
               <a:rPr lang="en-US" smtClean="0"/>
-              <a:t>2/24/2024</a:t>
+              <a:t>2/25/2024</a:t>
             </a:fld>
             <a:endParaRPr lang="en-US"/>
           </a:p>
@@ -2686,7 +2687,7 @@
           <a:p>
             <a:fld id="{DEB3416E-4F82-4F10-9177-896BFD4BC421}" type="datetimeFigureOut">
               <a:rPr lang="en-US" smtClean="0"/>
-              <a:t>2/24/2024</a:t>
+              <a:t>2/25/2024</a:t>
             </a:fld>
             <a:endParaRPr lang="en-US"/>
           </a:p>
@@ -2927,7 +2928,7 @@
           <a:p>
             <a:fld id="{DEB3416E-4F82-4F10-9177-896BFD4BC421}" type="datetimeFigureOut">
               <a:rPr lang="en-US" smtClean="0"/>
-              <a:t>2/24/2024</a:t>
+              <a:t>2/25/2024</a:t>
             </a:fld>
             <a:endParaRPr lang="en-US"/>
           </a:p>
@@ -4084,8 +4085,8 @@
         </p:nvSpPr>
         <p:spPr>
           <a:xfrm>
-            <a:off x="827849" y="1706017"/>
-            <a:ext cx="4357777" cy="3785652"/>
+            <a:off x="842226" y="1706017"/>
+            <a:ext cx="4113363" cy="3785652"/>
           </a:xfrm>
           <a:prstGeom prst="rect">
             <a:avLst/>
@@ -4156,10 +4157,10 @@
       </p:sp>
       <p:pic>
         <p:nvPicPr>
-          <p:cNvPr id="8" name="Content Placeholder 7" descr="A graph of a company size&#10;&#10;Description automatically generated">
-            <a:extLst>
-              <a:ext uri="{FF2B5EF4-FFF2-40B4-BE49-F238E27FC236}">
-                <a16:creationId xmlns:a16="http://schemas.microsoft.com/office/drawing/2014/main" id="{DD3AB24C-1027-0ADC-EBB6-C96FF8D9AB21}"/>
+          <p:cNvPr id="6" name="Content Placeholder 5" descr="A graph of a company size&#10;&#10;Description automatically generated">
+            <a:extLst>
+              <a:ext uri="{FF2B5EF4-FFF2-40B4-BE49-F238E27FC236}">
+                <a16:creationId xmlns:a16="http://schemas.microsoft.com/office/drawing/2014/main" id="{C732A341-9768-442F-4434-AF139A3FBADC}"/>
               </a:ext>
             </a:extLst>
           </p:cNvPr>
@@ -4178,8 +4179,8 @@
         </p:blipFill>
         <p:spPr>
           <a:xfrm>
-            <a:off x="5190227" y="1709547"/>
-            <a:ext cx="6441056" cy="3850248"/>
+            <a:off x="5003321" y="1711382"/>
+            <a:ext cx="6714225" cy="4004727"/>
           </a:xfrm>
         </p:spPr>
       </p:pic>
@@ -4576,10 +4577,10 @@
       </p:sp>
       <p:pic>
         <p:nvPicPr>
-          <p:cNvPr id="8" name="Content Placeholder 7" descr="A graph of a bar chart&#10;&#10;Description automatically generated">
-            <a:extLst>
-              <a:ext uri="{FF2B5EF4-FFF2-40B4-BE49-F238E27FC236}">
-                <a16:creationId xmlns:a16="http://schemas.microsoft.com/office/drawing/2014/main" id="{85347B8D-97C7-C007-477A-70A36BC7CE0C}"/>
+          <p:cNvPr id="6" name="Content Placeholder 5" descr="A graph of a bar chart&#10;&#10;Description automatically generated">
+            <a:extLst>
+              <a:ext uri="{FF2B5EF4-FFF2-40B4-BE49-F238E27FC236}">
+                <a16:creationId xmlns:a16="http://schemas.microsoft.com/office/drawing/2014/main" id="{B4231A56-F8B7-AAF8-1366-A77F5471663C}"/>
               </a:ext>
             </a:extLst>
           </p:cNvPr>

</xml_diff>